<commit_message>
change pic in ppt
</commit_message>
<xml_diff>
--- a/Medicare fraud detection by using open source data.pptx
+++ b/Medicare fraud detection by using open source data.pptx
@@ -7722,7 +7722,7 @@
       </p:sp>
       <p:pic>
         <p:nvPicPr>
-          <p:cNvPr id="5" name="Picture 4"/>
+          <p:cNvPr id="3" name="Picture 2"/>
           <p:cNvPicPr>
             <a:picLocks noChangeAspect="1"/>
           </p:cNvPicPr>
@@ -7736,8 +7736,8 @@
         </p:blipFill>
         <p:spPr>
           <a:xfrm>
-            <a:off x="6020418" y="3352676"/>
-            <a:ext cx="5225514" cy="3254749"/>
+            <a:off x="463138" y="3379474"/>
+            <a:ext cx="4788128" cy="3227951"/>
           </a:xfrm>
           <a:prstGeom prst="rect">
             <a:avLst/>
@@ -7746,7 +7746,7 @@
       </p:pic>
       <p:pic>
         <p:nvPicPr>
-          <p:cNvPr id="3" name="Picture 2"/>
+          <p:cNvPr id="4" name="Picture 3"/>
           <p:cNvPicPr>
             <a:picLocks noChangeAspect="1"/>
           </p:cNvPicPr>
@@ -7760,8 +7760,8 @@
         </p:blipFill>
         <p:spPr>
           <a:xfrm>
-            <a:off x="463138" y="3379474"/>
-            <a:ext cx="4788128" cy="3227951"/>
+            <a:off x="5552209" y="3138610"/>
+            <a:ext cx="5408716" cy="3495527"/>
           </a:xfrm>
           <a:prstGeom prst="rect">
             <a:avLst/>
@@ -7917,11 +7917,7 @@
           <a:p>
             <a:r>
               <a:rPr lang="en-US" dirty="0" smtClean="0"/>
-              <a:t>An </a:t>
-            </a:r>
-            <a:r>
-              <a:rPr lang="en-US" dirty="0" smtClean="0"/>
-              <a:t>example</a:t>
+              <a:t>An example</a:t>
             </a:r>
             <a:br>
               <a:rPr lang="en-US" dirty="0" smtClean="0"/>
@@ -8135,15 +8131,7 @@
           <a:p>
             <a:r>
               <a:rPr lang="en-US" dirty="0" smtClean="0"/>
-              <a:t># Plots for the data, </a:t>
-            </a:r>
-            <a:r>
-              <a:rPr lang="en-US" dirty="0" smtClean="0"/>
-              <a:t>histogram </a:t>
-            </a:r>
-            <a:r>
-              <a:rPr lang="en-US" dirty="0" smtClean="0"/>
-              <a:t>or bar chart</a:t>
+              <a:t># Plots for the data, histogram or bar chart</a:t>
             </a:r>
             <a:endParaRPr lang="en-US" dirty="0"/>
           </a:p>
@@ -8697,13 +8685,7 @@
               <a:rPr lang="en-US" dirty="0" smtClean="0">
                 <a:hlinkClick r:id="rId2"/>
               </a:rPr>
-              <a:t>https://www.versustexas.com/criminal/healthcare-medicare-medicaid-fraud</a:t>
-            </a:r>
-            <a:r>
-              <a:rPr lang="en-US" dirty="0" smtClean="0">
-                <a:hlinkClick r:id="rId2"/>
-              </a:rPr>
-              <a:t>/</a:t>
+              <a:t>https://www.versustexas.com/criminal/healthcare-medicare-medicaid-fraud/</a:t>
             </a:r>
             <a:endParaRPr lang="en-US" dirty="0" smtClean="0"/>
           </a:p>

</xml_diff>